<commit_message>
added github to pptx
</commit_message>
<xml_diff>
--- a/Credit risk pptx.pptx
+++ b/Credit risk pptx.pptx
@@ -3155,16 +3155,64 @@
               </a:lnSpc>
             </a:pPr>
             <a:r>
-              <a:rPr lang="en-US" sz="9120">
-                <a:solidFill>
-                  <a:srgbClr val="FFFFFF"/>
-                </a:solidFill>
-                <a:latin typeface="Courier Prime"/>
-                <a:ea typeface="Courier Prime"/>
-                <a:cs typeface="Courier Prime"/>
-                <a:sym typeface="Courier Prime"/>
-              </a:rPr>
-              <a:t>Predictor de riesgo crediticio{</a:t>
+              <a:rPr lang="en-US" sz="9120" dirty="0">
+                <a:solidFill>
+                  <a:srgbClr val="FFFFFF"/>
+                </a:solidFill>
+                <a:latin typeface="Courier Prime"/>
+                <a:ea typeface="Courier Prime"/>
+                <a:cs typeface="Courier Prime"/>
+                <a:sym typeface="Courier Prime"/>
+              </a:rPr>
+              <a:t>Predictor de </a:t>
+            </a:r>
+            <a:r>
+              <a:rPr lang="en-US" sz="9120" dirty="0" err="1">
+                <a:solidFill>
+                  <a:srgbClr val="FFFFFF"/>
+                </a:solidFill>
+                <a:latin typeface="Courier Prime"/>
+                <a:ea typeface="Courier Prime"/>
+                <a:cs typeface="Courier Prime"/>
+                <a:sym typeface="Courier Prime"/>
+              </a:rPr>
+              <a:t>riesgo</a:t>
+            </a:r>
+            <a:r>
+              <a:rPr lang="en-US" sz="9120" dirty="0">
+                <a:solidFill>
+                  <a:srgbClr val="FFFFFF"/>
+                </a:solidFill>
+                <a:latin typeface="Courier Prime"/>
+                <a:ea typeface="Courier Prime"/>
+                <a:cs typeface="Courier Prime"/>
+                <a:sym typeface="Courier Prime"/>
+              </a:rPr>
+              <a:t> </a:t>
+            </a:r>
+            <a:r>
+              <a:rPr lang="en-US" sz="9120" dirty="0" err="1">
+                <a:solidFill>
+                  <a:srgbClr val="FFFFFF"/>
+                </a:solidFill>
+                <a:latin typeface="Courier Prime"/>
+                <a:ea typeface="Courier Prime"/>
+                <a:cs typeface="Courier Prime"/>
+                <a:sym typeface="Courier Prime"/>
+              </a:rPr>
+              <a:t>crediticio</a:t>
+            </a:r>
+            <a:r>
+              <a:rPr lang="en-US" sz="9120" dirty="0">
+                <a:solidFill>
+                  <a:srgbClr val="FFFFFF"/>
+                </a:solidFill>
+                <a:latin typeface="Courier Prime"/>
+                <a:ea typeface="Courier Prime"/>
+                <a:cs typeface="Courier Prime"/>
+                <a:sym typeface="Courier Prime"/>
+              </a:rPr>
+              <a:t>{</a:t>
             </a:r>
           </a:p>
         </p:txBody>
@@ -3218,7 +3266,7 @@
         </p:nvSpPr>
         <p:spPr>
           <a:xfrm>
-            <a:off x="2278912" y="5790868"/>
+            <a:off x="2286000" y="5753100"/>
             <a:ext cx="10747189" cy="787361"/>
           </a:xfrm>
           <a:prstGeom prst="rect">
@@ -3237,7 +3285,7 @@
               </a:lnSpc>
             </a:pPr>
             <a:r>
-              <a:rPr lang="en-US" sz="4560">
+              <a:rPr lang="en-US" sz="4560" dirty="0">
                 <a:solidFill>
                   <a:srgbClr val="FF914D"/>
                 </a:solidFill>
@@ -3278,7 +3326,7 @@
               </a:lnSpc>
             </a:pPr>
             <a:r>
-              <a:rPr lang="en-US" sz="2736">
+              <a:rPr lang="en-US" sz="2736" dirty="0">
                 <a:solidFill>
                   <a:srgbClr val="737373"/>
                 </a:solidFill>
@@ -3382,6 +3430,46 @@
           <a:lstStyle/>
           <a:p>
             <a:endParaRPr lang="es-MX"/>
+          </a:p>
+        </p:txBody>
+      </p:sp>
+      <p:sp>
+        <p:nvSpPr>
+          <p:cNvPr id="11" name="CuadroTexto 10">
+            <a:extLst>
+              <a:ext uri="{FF2B5EF4-FFF2-40B4-BE49-F238E27FC236}">
+                <a16:creationId xmlns:a16="http://schemas.microsoft.com/office/drawing/2014/main" id="{C40B861E-9373-E3D4-51BC-16CB1B85516F}"/>
+              </a:ext>
+            </a:extLst>
+          </p:cNvPr>
+          <p:cNvSpPr txBox="1"/>
+          <p:nvPr/>
+        </p:nvSpPr>
+        <p:spPr>
+          <a:xfrm>
+            <a:off x="14916540" y="9600255"/>
+            <a:ext cx="3921745" cy="369332"/>
+          </a:xfrm>
+          <a:prstGeom prst="rect">
+            <a:avLst/>
+          </a:prstGeom>
+          <a:noFill/>
+        </p:spPr>
+        <p:txBody>
+          <a:bodyPr wrap="square">
+            <a:spAutoFit/>
+          </a:bodyPr>
+          <a:lstStyle/>
+          <a:p>
+            <a:r>
+              <a:rPr lang="es-MX" dirty="0">
+                <a:solidFill>
+                  <a:schemeClr val="bg1"/>
+                </a:solidFill>
+                <a:latin typeface="Courier Prime" panose="020B0604020202020204" charset="0"/>
+              </a:rPr>
+              <a:t>https://github.com/Chelqq/</a:t>
+            </a:r>
           </a:p>
         </p:txBody>
       </p:sp>

</xml_diff>

<commit_message>
added docx and changes to ipynb
</commit_message>
<xml_diff>
--- a/Credit risk pptx.pptx
+++ b/Credit risk pptx.pptx
@@ -338,7 +338,7 @@
             <a:fld id="{1D8BD707-D9CF-40AE-B4C6-C98DA3205C09}" type="datetimeFigureOut">
               <a:rPr lang="en-US" smtClean="0"/>
               <a:pPr/>
-              <a:t>11/26/2024</a:t>
+              <a:t>11/28/2024</a:t>
             </a:fld>
             <a:endParaRPr lang="en-US"/>
           </a:p>
@@ -503,7 +503,7 @@
             <a:fld id="{1D8BD707-D9CF-40AE-B4C6-C98DA3205C09}" type="datetimeFigureOut">
               <a:rPr lang="en-US" smtClean="0"/>
               <a:pPr/>
-              <a:t>11/26/2024</a:t>
+              <a:t>11/28/2024</a:t>
             </a:fld>
             <a:endParaRPr lang="en-US"/>
           </a:p>
@@ -678,7 +678,7 @@
             <a:fld id="{1D8BD707-D9CF-40AE-B4C6-C98DA3205C09}" type="datetimeFigureOut">
               <a:rPr lang="en-US" smtClean="0"/>
               <a:pPr/>
-              <a:t>11/26/2024</a:t>
+              <a:t>11/28/2024</a:t>
             </a:fld>
             <a:endParaRPr lang="en-US"/>
           </a:p>
@@ -843,7 +843,7 @@
             <a:fld id="{1D8BD707-D9CF-40AE-B4C6-C98DA3205C09}" type="datetimeFigureOut">
               <a:rPr lang="en-US" smtClean="0"/>
               <a:pPr/>
-              <a:t>11/26/2024</a:t>
+              <a:t>11/28/2024</a:t>
             </a:fld>
             <a:endParaRPr lang="en-US"/>
           </a:p>
@@ -1085,7 +1085,7 @@
             <a:fld id="{1D8BD707-D9CF-40AE-B4C6-C98DA3205C09}" type="datetimeFigureOut">
               <a:rPr lang="en-US" smtClean="0"/>
               <a:pPr/>
-              <a:t>11/26/2024</a:t>
+              <a:t>11/28/2024</a:t>
             </a:fld>
             <a:endParaRPr lang="en-US"/>
           </a:p>
@@ -1367,7 +1367,7 @@
             <a:fld id="{1D8BD707-D9CF-40AE-B4C6-C98DA3205C09}" type="datetimeFigureOut">
               <a:rPr lang="en-US" smtClean="0"/>
               <a:pPr/>
-              <a:t>11/26/2024</a:t>
+              <a:t>11/28/2024</a:t>
             </a:fld>
             <a:endParaRPr lang="en-US"/>
           </a:p>
@@ -1783,7 +1783,7 @@
             <a:fld id="{1D8BD707-D9CF-40AE-B4C6-C98DA3205C09}" type="datetimeFigureOut">
               <a:rPr lang="en-US" smtClean="0"/>
               <a:pPr/>
-              <a:t>11/26/2024</a:t>
+              <a:t>11/28/2024</a:t>
             </a:fld>
             <a:endParaRPr lang="en-US"/>
           </a:p>
@@ -1897,7 +1897,7 @@
             <a:fld id="{1D8BD707-D9CF-40AE-B4C6-C98DA3205C09}" type="datetimeFigureOut">
               <a:rPr lang="en-US" smtClean="0"/>
               <a:pPr/>
-              <a:t>11/26/2024</a:t>
+              <a:t>11/28/2024</a:t>
             </a:fld>
             <a:endParaRPr lang="en-US"/>
           </a:p>
@@ -1989,7 +1989,7 @@
             <a:fld id="{1D8BD707-D9CF-40AE-B4C6-C98DA3205C09}" type="datetimeFigureOut">
               <a:rPr lang="en-US" smtClean="0"/>
               <a:pPr/>
-              <a:t>11/26/2024</a:t>
+              <a:t>11/28/2024</a:t>
             </a:fld>
             <a:endParaRPr lang="en-US"/>
           </a:p>
@@ -2261,7 +2261,7 @@
             <a:fld id="{1D8BD707-D9CF-40AE-B4C6-C98DA3205C09}" type="datetimeFigureOut">
               <a:rPr lang="en-US" smtClean="0"/>
               <a:pPr/>
-              <a:t>11/26/2024</a:t>
+              <a:t>11/28/2024</a:t>
             </a:fld>
             <a:endParaRPr lang="en-US"/>
           </a:p>
@@ -2510,7 +2510,7 @@
             <a:fld id="{1D8BD707-D9CF-40AE-B4C6-C98DA3205C09}" type="datetimeFigureOut">
               <a:rPr lang="en-US" smtClean="0"/>
               <a:pPr/>
-              <a:t>11/26/2024</a:t>
+              <a:t>11/28/2024</a:t>
             </a:fld>
             <a:endParaRPr lang="en-US"/>
           </a:p>
@@ -2718,7 +2718,7 @@
             <a:fld id="{1D8BD707-D9CF-40AE-B4C6-C98DA3205C09}" type="datetimeFigureOut">
               <a:rPr lang="en-US" smtClean="0"/>
               <a:pPr/>
-              <a:t>11/26/2024</a:t>
+              <a:t>11/28/2024</a:t>
             </a:fld>
             <a:endParaRPr lang="en-US"/>
           </a:p>
@@ -5621,7 +5621,7 @@
           </a:bodyPr>
           <a:lstStyle/>
           <a:p>
-            <a:pPr algn="ctr">
+            <a:pPr lvl="1" algn="ctr">
               <a:lnSpc>
                 <a:spcPts val="3762"/>
               </a:lnSpc>
@@ -5739,7 +5739,7 @@
             </a:r>
           </a:p>
           <a:p>
-            <a:pPr algn="ctr">
+            <a:pPr lvl="1" algn="ctr">
               <a:lnSpc>
                 <a:spcPts val="3762"/>
               </a:lnSpc>
@@ -5758,7 +5758,7 @@
             </a:endParaRPr>
           </a:p>
           <a:p>
-            <a:pPr algn="ctr">
+            <a:pPr lvl="1" algn="ctr">
               <a:lnSpc>
                 <a:spcPts val="3762"/>
               </a:lnSpc>
@@ -8373,16 +8373,568 @@
               </a:spcBef>
             </a:pPr>
             <a:r>
-              <a:rPr lang="en-US" sz="3300" u="none" strike="noStrike">
-                <a:solidFill>
-                  <a:srgbClr val="FFFFFF"/>
-                </a:solidFill>
-                <a:latin typeface="Courier Prime"/>
-                <a:ea typeface="Courier Prime"/>
-                <a:cs typeface="Courier Prime"/>
-                <a:sym typeface="Courier Prime"/>
-              </a:rPr>
-              <a:t>La matriz de confusión y el informe de clasificación sugieren que, aunque el modelo tiene un buen desempeño general, todavía existen errores de clasificación, especialmente en los falsos positivos y falsos negativos.</a:t>
+              <a:rPr lang="en-US" sz="3300" u="none" strike="noStrike" dirty="0">
+                <a:solidFill>
+                  <a:srgbClr val="FFFFFF"/>
+                </a:solidFill>
+                <a:latin typeface="Courier Prime"/>
+                <a:ea typeface="Courier Prime"/>
+                <a:cs typeface="Courier Prime"/>
+                <a:sym typeface="Courier Prime"/>
+              </a:rPr>
+              <a:t>La </a:t>
+            </a:r>
+            <a:r>
+              <a:rPr lang="en-US" sz="3300" u="none" strike="noStrike" dirty="0" err="1">
+                <a:solidFill>
+                  <a:srgbClr val="FFFFFF"/>
+                </a:solidFill>
+                <a:latin typeface="Courier Prime"/>
+                <a:ea typeface="Courier Prime"/>
+                <a:cs typeface="Courier Prime"/>
+                <a:sym typeface="Courier Prime"/>
+              </a:rPr>
+              <a:t>matriz</a:t>
+            </a:r>
+            <a:r>
+              <a:rPr lang="en-US" sz="3300" u="none" strike="noStrike" dirty="0">
+                <a:solidFill>
+                  <a:srgbClr val="FFFFFF"/>
+                </a:solidFill>
+                <a:latin typeface="Courier Prime"/>
+                <a:ea typeface="Courier Prime"/>
+                <a:cs typeface="Courier Prime"/>
+                <a:sym typeface="Courier Prime"/>
+              </a:rPr>
+              <a:t> de </a:t>
+            </a:r>
+            <a:r>
+              <a:rPr lang="en-US" sz="3300" u="none" strike="noStrike" dirty="0" err="1">
+                <a:solidFill>
+                  <a:srgbClr val="FFFFFF"/>
+                </a:solidFill>
+                <a:latin typeface="Courier Prime"/>
+                <a:ea typeface="Courier Prime"/>
+                <a:cs typeface="Courier Prime"/>
+                <a:sym typeface="Courier Prime"/>
+              </a:rPr>
+              <a:t>confusión</a:t>
+            </a:r>
+            <a:r>
+              <a:rPr lang="en-US" sz="3300" u="none" strike="noStrike" dirty="0">
+                <a:solidFill>
+                  <a:srgbClr val="FFFFFF"/>
+                </a:solidFill>
+                <a:latin typeface="Courier Prime"/>
+                <a:ea typeface="Courier Prime"/>
+                <a:cs typeface="Courier Prime"/>
+                <a:sym typeface="Courier Prime"/>
+              </a:rPr>
+              <a:t> y </a:t>
+            </a:r>
+            <a:r>
+              <a:rPr lang="en-US" sz="3300" u="none" strike="noStrike" dirty="0" err="1">
+                <a:solidFill>
+                  <a:srgbClr val="FFFFFF"/>
+                </a:solidFill>
+                <a:latin typeface="Courier Prime"/>
+                <a:ea typeface="Courier Prime"/>
+                <a:cs typeface="Courier Prime"/>
+                <a:sym typeface="Courier Prime"/>
+              </a:rPr>
+              <a:t>el</a:t>
+            </a:r>
+            <a:r>
+              <a:rPr lang="en-US" sz="3300" u="none" strike="noStrike" dirty="0">
+                <a:solidFill>
+                  <a:srgbClr val="FFFFFF"/>
+                </a:solidFill>
+                <a:latin typeface="Courier Prime"/>
+                <a:ea typeface="Courier Prime"/>
+                <a:cs typeface="Courier Prime"/>
+                <a:sym typeface="Courier Prime"/>
+              </a:rPr>
+              <a:t> </a:t>
+            </a:r>
+            <a:r>
+              <a:rPr lang="en-US" sz="3300" u="none" strike="noStrike" dirty="0" err="1">
+                <a:solidFill>
+                  <a:srgbClr val="FFFFFF"/>
+                </a:solidFill>
+                <a:latin typeface="Courier Prime"/>
+                <a:ea typeface="Courier Prime"/>
+                <a:cs typeface="Courier Prime"/>
+                <a:sym typeface="Courier Prime"/>
+              </a:rPr>
+              <a:t>informe</a:t>
+            </a:r>
+            <a:r>
+              <a:rPr lang="en-US" sz="3300" u="none" strike="noStrike" dirty="0">
+                <a:solidFill>
+                  <a:srgbClr val="FFFFFF"/>
+                </a:solidFill>
+                <a:latin typeface="Courier Prime"/>
+                <a:ea typeface="Courier Prime"/>
+                <a:cs typeface="Courier Prime"/>
+                <a:sym typeface="Courier Prime"/>
+              </a:rPr>
+              <a:t> de </a:t>
+            </a:r>
+            <a:r>
+              <a:rPr lang="en-US" sz="3300" u="none" strike="noStrike" dirty="0" err="1">
+                <a:solidFill>
+                  <a:srgbClr val="FFFFFF"/>
+                </a:solidFill>
+                <a:latin typeface="Courier Prime"/>
+                <a:ea typeface="Courier Prime"/>
+                <a:cs typeface="Courier Prime"/>
+                <a:sym typeface="Courier Prime"/>
+              </a:rPr>
+              <a:t>clasificación</a:t>
+            </a:r>
+            <a:r>
+              <a:rPr lang="en-US" sz="3300" u="none" strike="noStrike" dirty="0">
+                <a:solidFill>
+                  <a:srgbClr val="FFFFFF"/>
+                </a:solidFill>
+                <a:latin typeface="Courier Prime"/>
+                <a:ea typeface="Courier Prime"/>
+                <a:cs typeface="Courier Prime"/>
+                <a:sym typeface="Courier Prime"/>
+              </a:rPr>
+              <a:t> </a:t>
+            </a:r>
+            <a:r>
+              <a:rPr lang="en-US" sz="3300" u="none" strike="noStrike" dirty="0" err="1">
+                <a:solidFill>
+                  <a:srgbClr val="FFFFFF"/>
+                </a:solidFill>
+                <a:latin typeface="Courier Prime"/>
+                <a:ea typeface="Courier Prime"/>
+                <a:cs typeface="Courier Prime"/>
+                <a:sym typeface="Courier Prime"/>
+              </a:rPr>
+              <a:t>sugieren</a:t>
+            </a:r>
+            <a:r>
+              <a:rPr lang="en-US" sz="3300" u="none" strike="noStrike" dirty="0">
+                <a:solidFill>
+                  <a:srgbClr val="FFFFFF"/>
+                </a:solidFill>
+                <a:latin typeface="Courier Prime"/>
+                <a:ea typeface="Courier Prime"/>
+                <a:cs typeface="Courier Prime"/>
+                <a:sym typeface="Courier Prime"/>
+              </a:rPr>
+              <a:t> que, </a:t>
+            </a:r>
+            <a:r>
+              <a:rPr lang="en-US" sz="3300" u="none" strike="noStrike" dirty="0" err="1">
+                <a:solidFill>
+                  <a:srgbClr val="FFFFFF"/>
+                </a:solidFill>
+                <a:latin typeface="Courier Prime"/>
+                <a:ea typeface="Courier Prime"/>
+                <a:cs typeface="Courier Prime"/>
+                <a:sym typeface="Courier Prime"/>
+              </a:rPr>
+              <a:t>aunque</a:t>
+            </a:r>
+            <a:r>
+              <a:rPr lang="en-US" sz="3300" u="none" strike="noStrike" dirty="0">
+                <a:solidFill>
+                  <a:srgbClr val="FFFFFF"/>
+                </a:solidFill>
+                <a:latin typeface="Courier Prime"/>
+                <a:ea typeface="Courier Prime"/>
+                <a:cs typeface="Courier Prime"/>
+                <a:sym typeface="Courier Prime"/>
+              </a:rPr>
+              <a:t> </a:t>
+            </a:r>
+            <a:r>
+              <a:rPr lang="en-US" sz="3300" u="none" strike="noStrike" dirty="0" err="1">
+                <a:solidFill>
+                  <a:srgbClr val="FFFFFF"/>
+                </a:solidFill>
+                <a:latin typeface="Courier Prime"/>
+                <a:ea typeface="Courier Prime"/>
+                <a:cs typeface="Courier Prime"/>
+                <a:sym typeface="Courier Prime"/>
+              </a:rPr>
+              <a:t>el</a:t>
+            </a:r>
+            <a:r>
+              <a:rPr lang="en-US" sz="3300" u="none" strike="noStrike" dirty="0">
+                <a:solidFill>
+                  <a:srgbClr val="FFFFFF"/>
+                </a:solidFill>
+                <a:latin typeface="Courier Prime"/>
+                <a:ea typeface="Courier Prime"/>
+                <a:cs typeface="Courier Prime"/>
+                <a:sym typeface="Courier Prime"/>
+              </a:rPr>
+              <a:t> </a:t>
+            </a:r>
+            <a:r>
+              <a:rPr lang="en-US" sz="3300" u="none" strike="noStrike" dirty="0" err="1">
+                <a:solidFill>
+                  <a:srgbClr val="FFFFFF"/>
+                </a:solidFill>
+                <a:latin typeface="Courier Prime"/>
+                <a:ea typeface="Courier Prime"/>
+                <a:cs typeface="Courier Prime"/>
+                <a:sym typeface="Courier Prime"/>
+              </a:rPr>
+              <a:t>modelo</a:t>
+            </a:r>
+            <a:r>
+              <a:rPr lang="en-US" sz="3300" u="none" strike="noStrike" dirty="0">
+                <a:solidFill>
+                  <a:srgbClr val="FFFFFF"/>
+                </a:solidFill>
+                <a:latin typeface="Courier Prime"/>
+                <a:ea typeface="Courier Prime"/>
+                <a:cs typeface="Courier Prime"/>
+                <a:sym typeface="Courier Prime"/>
+              </a:rPr>
+              <a:t> </a:t>
+            </a:r>
+            <a:r>
+              <a:rPr lang="en-US" sz="3300" u="none" strike="noStrike" dirty="0" err="1">
+                <a:solidFill>
+                  <a:srgbClr val="FFFFFF"/>
+                </a:solidFill>
+                <a:latin typeface="Courier Prime"/>
+                <a:ea typeface="Courier Prime"/>
+                <a:cs typeface="Courier Prime"/>
+                <a:sym typeface="Courier Prime"/>
+              </a:rPr>
+              <a:t>tiene</a:t>
+            </a:r>
+            <a:r>
+              <a:rPr lang="en-US" sz="3300" u="none" strike="noStrike" dirty="0">
+                <a:solidFill>
+                  <a:srgbClr val="FFFFFF"/>
+                </a:solidFill>
+                <a:latin typeface="Courier Prime"/>
+                <a:ea typeface="Courier Prime"/>
+                <a:cs typeface="Courier Prime"/>
+                <a:sym typeface="Courier Prime"/>
+              </a:rPr>
+              <a:t> un </a:t>
+            </a:r>
+            <a:r>
+              <a:rPr lang="en-US" sz="3300" u="none" strike="noStrike" dirty="0" err="1">
+                <a:solidFill>
+                  <a:srgbClr val="FFFFFF"/>
+                </a:solidFill>
+                <a:latin typeface="Courier Prime"/>
+                <a:ea typeface="Courier Prime"/>
+                <a:cs typeface="Courier Prime"/>
+                <a:sym typeface="Courier Prime"/>
+              </a:rPr>
+              <a:t>buen</a:t>
+            </a:r>
+            <a:r>
+              <a:rPr lang="en-US" sz="3300" u="none" strike="noStrike" dirty="0">
+                <a:solidFill>
+                  <a:srgbClr val="FFFFFF"/>
+                </a:solidFill>
+                <a:latin typeface="Courier Prime"/>
+                <a:ea typeface="Courier Prime"/>
+                <a:cs typeface="Courier Prime"/>
+                <a:sym typeface="Courier Prime"/>
+              </a:rPr>
+              <a:t> </a:t>
+            </a:r>
+            <a:r>
+              <a:rPr lang="en-US" sz="3300" u="none" strike="noStrike" dirty="0" err="1">
+                <a:solidFill>
+                  <a:srgbClr val="FFFFFF"/>
+                </a:solidFill>
+                <a:latin typeface="Courier Prime"/>
+                <a:ea typeface="Courier Prime"/>
+                <a:cs typeface="Courier Prime"/>
+                <a:sym typeface="Courier Prime"/>
+              </a:rPr>
+              <a:t>desempeño</a:t>
+            </a:r>
+            <a:r>
+              <a:rPr lang="en-US" sz="3300" u="none" strike="noStrike" dirty="0">
+                <a:solidFill>
+                  <a:srgbClr val="FFFFFF"/>
+                </a:solidFill>
+                <a:latin typeface="Courier Prime"/>
+                <a:ea typeface="Courier Prime"/>
+                <a:cs typeface="Courier Prime"/>
+                <a:sym typeface="Courier Prime"/>
+              </a:rPr>
+              <a:t> general, </a:t>
+            </a:r>
+            <a:r>
+              <a:rPr lang="en-US" sz="3300" u="none" strike="noStrike" dirty="0" err="1">
+                <a:solidFill>
+                  <a:srgbClr val="FFFFFF"/>
+                </a:solidFill>
+                <a:latin typeface="Courier Prime"/>
+                <a:ea typeface="Courier Prime"/>
+                <a:cs typeface="Courier Prime"/>
+                <a:sym typeface="Courier Prime"/>
+              </a:rPr>
+              <a:t>todavía</a:t>
+            </a:r>
+            <a:r>
+              <a:rPr lang="en-US" sz="3300" u="none" strike="noStrike" dirty="0">
+                <a:solidFill>
+                  <a:srgbClr val="FFFFFF"/>
+                </a:solidFill>
+                <a:latin typeface="Courier Prime"/>
+                <a:ea typeface="Courier Prime"/>
+                <a:cs typeface="Courier Prime"/>
+                <a:sym typeface="Courier Prime"/>
+              </a:rPr>
+              <a:t> </a:t>
+            </a:r>
+            <a:r>
+              <a:rPr lang="en-US" sz="3300" u="none" strike="noStrike" dirty="0" err="1">
+                <a:solidFill>
+                  <a:srgbClr val="FFFFFF"/>
+                </a:solidFill>
+                <a:latin typeface="Courier Prime"/>
+                <a:ea typeface="Courier Prime"/>
+                <a:cs typeface="Courier Prime"/>
+                <a:sym typeface="Courier Prime"/>
+              </a:rPr>
+              <a:t>existen</a:t>
+            </a:r>
+            <a:r>
+              <a:rPr lang="en-US" sz="3300" u="none" strike="noStrike" dirty="0">
+                <a:solidFill>
+                  <a:srgbClr val="FFFFFF"/>
+                </a:solidFill>
+                <a:latin typeface="Courier Prime"/>
+                <a:ea typeface="Courier Prime"/>
+                <a:cs typeface="Courier Prime"/>
+                <a:sym typeface="Courier Prime"/>
+              </a:rPr>
+              <a:t> </a:t>
+            </a:r>
+            <a:r>
+              <a:rPr lang="en-US" sz="3300" u="none" strike="noStrike" dirty="0" err="1">
+                <a:solidFill>
+                  <a:srgbClr val="FFFFFF"/>
+                </a:solidFill>
+                <a:latin typeface="Courier Prime"/>
+                <a:ea typeface="Courier Prime"/>
+                <a:cs typeface="Courier Prime"/>
+                <a:sym typeface="Courier Prime"/>
+              </a:rPr>
+              <a:t>errores</a:t>
+            </a:r>
+            <a:r>
+              <a:rPr lang="en-US" sz="3300" u="none" strike="noStrike" dirty="0">
+                <a:solidFill>
+                  <a:srgbClr val="FFFFFF"/>
+                </a:solidFill>
+                <a:latin typeface="Courier Prime"/>
+                <a:ea typeface="Courier Prime"/>
+                <a:cs typeface="Courier Prime"/>
+                <a:sym typeface="Courier Prime"/>
+              </a:rPr>
+              <a:t> de </a:t>
+            </a:r>
+            <a:r>
+              <a:rPr lang="en-US" sz="3300" u="none" strike="noStrike" dirty="0" err="1">
+                <a:solidFill>
+                  <a:srgbClr val="FFFFFF"/>
+                </a:solidFill>
+                <a:latin typeface="Courier Prime"/>
+                <a:ea typeface="Courier Prime"/>
+                <a:cs typeface="Courier Prime"/>
+                <a:sym typeface="Courier Prime"/>
+              </a:rPr>
+              <a:t>clasificación</a:t>
+            </a:r>
+            <a:r>
+              <a:rPr lang="en-US" sz="3300" u="none" strike="noStrike" dirty="0">
+                <a:solidFill>
+                  <a:srgbClr val="FFFFFF"/>
+                </a:solidFill>
+                <a:latin typeface="Courier Prime"/>
+                <a:ea typeface="Courier Prime"/>
+                <a:cs typeface="Courier Prime"/>
+                <a:sym typeface="Courier Prime"/>
+              </a:rPr>
+              <a:t>, </a:t>
+            </a:r>
+            <a:r>
+              <a:rPr lang="en-US" sz="3300" u="none" strike="noStrike" dirty="0" err="1">
+                <a:solidFill>
+                  <a:srgbClr val="FFFFFF"/>
+                </a:solidFill>
+                <a:latin typeface="Courier Prime"/>
+                <a:ea typeface="Courier Prime"/>
+                <a:cs typeface="Courier Prime"/>
+                <a:sym typeface="Courier Prime"/>
+              </a:rPr>
+              <a:t>especialmente</a:t>
+            </a:r>
+            <a:r>
+              <a:rPr lang="en-US" sz="3300" u="none" strike="noStrike" dirty="0">
+                <a:solidFill>
+                  <a:srgbClr val="FFFFFF"/>
+                </a:solidFill>
+                <a:latin typeface="Courier Prime"/>
+                <a:ea typeface="Courier Prime"/>
+                <a:cs typeface="Courier Prime"/>
+                <a:sym typeface="Courier Prime"/>
+              </a:rPr>
+              <a:t> </a:t>
+            </a:r>
+            <a:r>
+              <a:rPr lang="en-US" sz="3300" u="none" strike="noStrike" dirty="0" err="1">
+                <a:solidFill>
+                  <a:srgbClr val="FFFFFF"/>
+                </a:solidFill>
+                <a:latin typeface="Courier Prime"/>
+                <a:ea typeface="Courier Prime"/>
+                <a:cs typeface="Courier Prime"/>
+                <a:sym typeface="Courier Prime"/>
+              </a:rPr>
+              <a:t>en</a:t>
+            </a:r>
+            <a:r>
+              <a:rPr lang="en-US" sz="3300" u="none" strike="noStrike" dirty="0">
+                <a:solidFill>
+                  <a:srgbClr val="FFFFFF"/>
+                </a:solidFill>
+                <a:latin typeface="Courier Prime"/>
+                <a:ea typeface="Courier Prime"/>
+                <a:cs typeface="Courier Prime"/>
+                <a:sym typeface="Courier Prime"/>
+              </a:rPr>
+              <a:t> </a:t>
+            </a:r>
+            <a:r>
+              <a:rPr lang="en-US" sz="3300" u="none" strike="noStrike" dirty="0" err="1">
+                <a:solidFill>
+                  <a:srgbClr val="FFFFFF"/>
+                </a:solidFill>
+                <a:latin typeface="Courier Prime"/>
+                <a:ea typeface="Courier Prime"/>
+                <a:cs typeface="Courier Prime"/>
+                <a:sym typeface="Courier Prime"/>
+              </a:rPr>
+              <a:t>los</a:t>
+            </a:r>
+            <a:r>
+              <a:rPr lang="en-US" sz="3300" u="none" strike="noStrike" dirty="0">
+                <a:solidFill>
+                  <a:srgbClr val="FFFFFF"/>
+                </a:solidFill>
+                <a:latin typeface="Courier Prime"/>
+                <a:ea typeface="Courier Prime"/>
+                <a:cs typeface="Courier Prime"/>
+                <a:sym typeface="Courier Prime"/>
+              </a:rPr>
+              <a:t> </a:t>
+            </a:r>
+            <a:r>
+              <a:rPr lang="en-US" sz="3300" u="none" strike="noStrike" dirty="0" err="1">
+                <a:solidFill>
+                  <a:srgbClr val="FFFFFF"/>
+                </a:solidFill>
+                <a:latin typeface="Courier Prime"/>
+                <a:ea typeface="Courier Prime"/>
+                <a:cs typeface="Courier Prime"/>
+                <a:sym typeface="Courier Prime"/>
+              </a:rPr>
+              <a:t>falsos</a:t>
+            </a:r>
+            <a:r>
+              <a:rPr lang="en-US" sz="3300" u="none" strike="noStrike" dirty="0">
+                <a:solidFill>
+                  <a:srgbClr val="FFFFFF"/>
+                </a:solidFill>
+                <a:latin typeface="Courier Prime"/>
+                <a:ea typeface="Courier Prime"/>
+                <a:cs typeface="Courier Prime"/>
+                <a:sym typeface="Courier Prime"/>
+              </a:rPr>
+              <a:t> </a:t>
+            </a:r>
+            <a:r>
+              <a:rPr lang="en-US" sz="3300" u="none" strike="noStrike" dirty="0" err="1">
+                <a:solidFill>
+                  <a:srgbClr val="FFFFFF"/>
+                </a:solidFill>
+                <a:latin typeface="Courier Prime"/>
+                <a:ea typeface="Courier Prime"/>
+                <a:cs typeface="Courier Prime"/>
+                <a:sym typeface="Courier Prime"/>
+              </a:rPr>
+              <a:t>positivos</a:t>
+            </a:r>
+            <a:r>
+              <a:rPr lang="en-US" sz="3300" u="none" strike="noStrike" dirty="0">
+                <a:solidFill>
+                  <a:srgbClr val="FFFFFF"/>
+                </a:solidFill>
+                <a:latin typeface="Courier Prime"/>
+                <a:ea typeface="Courier Prime"/>
+                <a:cs typeface="Courier Prime"/>
+                <a:sym typeface="Courier Prime"/>
+              </a:rPr>
+              <a:t> y </a:t>
+            </a:r>
+            <a:r>
+              <a:rPr lang="en-US" sz="3300" u="none" strike="noStrike" dirty="0" err="1">
+                <a:solidFill>
+                  <a:srgbClr val="FFFFFF"/>
+                </a:solidFill>
+                <a:latin typeface="Courier Prime"/>
+                <a:ea typeface="Courier Prime"/>
+                <a:cs typeface="Courier Prime"/>
+                <a:sym typeface="Courier Prime"/>
+              </a:rPr>
+              <a:t>falsos</a:t>
+            </a:r>
+            <a:r>
+              <a:rPr lang="en-US" sz="3300" u="none" strike="noStrike" dirty="0">
+                <a:solidFill>
+                  <a:srgbClr val="FFFFFF"/>
+                </a:solidFill>
+                <a:latin typeface="Courier Prime"/>
+                <a:ea typeface="Courier Prime"/>
+                <a:cs typeface="Courier Prime"/>
+                <a:sym typeface="Courier Prime"/>
+              </a:rPr>
+              <a:t> </a:t>
+            </a:r>
+            <a:r>
+              <a:rPr lang="en-US" sz="3300" u="none" strike="noStrike" dirty="0" err="1">
+                <a:solidFill>
+                  <a:srgbClr val="FFFFFF"/>
+                </a:solidFill>
+                <a:latin typeface="Courier Prime"/>
+                <a:ea typeface="Courier Prime"/>
+                <a:cs typeface="Courier Prime"/>
+                <a:sym typeface="Courier Prime"/>
+              </a:rPr>
+              <a:t>negativos</a:t>
+            </a:r>
+            <a:r>
+              <a:rPr lang="en-US" sz="3300" u="none" strike="noStrike" dirty="0">
+                <a:solidFill>
+                  <a:srgbClr val="FFFFFF"/>
+                </a:solidFill>
+                <a:latin typeface="Courier Prime"/>
+                <a:ea typeface="Courier Prime"/>
+                <a:cs typeface="Courier Prime"/>
+                <a:sym typeface="Courier Prime"/>
+              </a:rPr>
+              <a:t>.</a:t>
             </a:r>
           </a:p>
           <a:p>
@@ -8394,7 +8946,7 @@
                 <a:spcPct val="0"/>
               </a:spcBef>
             </a:pPr>
-            <a:endParaRPr lang="en-US" sz="3300" u="none" strike="noStrike">
+            <a:endParaRPr lang="en-US" sz="3300" u="none" strike="noStrike" dirty="0">
               <a:solidFill>
                 <a:srgbClr val="FFFFFF"/>
               </a:solidFill>
@@ -10282,19 +10834,43 @@
               </a:lnSpc>
             </a:pPr>
             <a:r>
-              <a:rPr lang="en-US" sz="2400">
-                <a:solidFill>
-                  <a:srgbClr val="FFFFFF"/>
-                </a:solidFill>
-                <a:latin typeface="Courier Prime"/>
-                <a:ea typeface="Courier Prime"/>
-                <a:cs typeface="Courier Prime"/>
-                <a:sym typeface="Courier Prime"/>
-              </a:rPr>
-              <a:t>El objetivo es </a:t>
-            </a:r>
-            <a:r>
-              <a:rPr lang="en-US" sz="2400">
+              <a:rPr lang="en-US" sz="2400" dirty="0">
+                <a:solidFill>
+                  <a:srgbClr val="FFFFFF"/>
+                </a:solidFill>
+                <a:latin typeface="Courier Prime"/>
+                <a:ea typeface="Courier Prime"/>
+                <a:cs typeface="Courier Prime"/>
+                <a:sym typeface="Courier Prime"/>
+              </a:rPr>
+              <a:t>El </a:t>
+            </a:r>
+            <a:r>
+              <a:rPr lang="en-US" sz="2400" dirty="0" err="1">
+                <a:solidFill>
+                  <a:srgbClr val="FFFFFF"/>
+                </a:solidFill>
+                <a:latin typeface="Courier Prime"/>
+                <a:ea typeface="Courier Prime"/>
+                <a:cs typeface="Courier Prime"/>
+                <a:sym typeface="Courier Prime"/>
+              </a:rPr>
+              <a:t>objetivo</a:t>
+            </a:r>
+            <a:r>
+              <a:rPr lang="en-US" sz="2400" dirty="0">
+                <a:solidFill>
+                  <a:srgbClr val="FFFFFF"/>
+                </a:solidFill>
+                <a:latin typeface="Courier Prime"/>
+                <a:ea typeface="Courier Prime"/>
+                <a:cs typeface="Courier Prime"/>
+                <a:sym typeface="Courier Prime"/>
+              </a:rPr>
+              <a:t> es </a:t>
+            </a:r>
+            <a:r>
+              <a:rPr lang="en-US" sz="2400" dirty="0" err="1">
                 <a:solidFill>
                   <a:srgbClr val="FF914D"/>
                 </a:solidFill>
@@ -10303,19 +10879,403 @@
                 <a:cs typeface="Courier Prime"/>
                 <a:sym typeface="Courier Prime"/>
               </a:rPr>
-              <a:t>clasificar el riesgo crediticio</a:t>
-            </a:r>
-            <a:r>
-              <a:rPr lang="en-US" sz="2400">
-                <a:solidFill>
-                  <a:srgbClr val="FFFFFF"/>
-                </a:solidFill>
-                <a:latin typeface="Courier Prime"/>
-                <a:ea typeface="Courier Prime"/>
-                <a:cs typeface="Courier Prime"/>
-                <a:sym typeface="Courier Prime"/>
-              </a:rPr>
-              <a:t> de los individuos en función de su información financiera y demográfica utilizando el dataset de kaggle (ver biblio). </a:t>
+              <a:t>clasificar</a:t>
+            </a:r>
+            <a:r>
+              <a:rPr lang="en-US" sz="2400" dirty="0">
+                <a:solidFill>
+                  <a:srgbClr val="FF914D"/>
+                </a:solidFill>
+                <a:latin typeface="Courier Prime"/>
+                <a:ea typeface="Courier Prime"/>
+                <a:cs typeface="Courier Prime"/>
+                <a:sym typeface="Courier Prime"/>
+              </a:rPr>
+              <a:t> </a:t>
+            </a:r>
+            <a:r>
+              <a:rPr lang="en-US" sz="2400" dirty="0" err="1">
+                <a:solidFill>
+                  <a:srgbClr val="FF914D"/>
+                </a:solidFill>
+                <a:latin typeface="Courier Prime"/>
+                <a:ea typeface="Courier Prime"/>
+                <a:cs typeface="Courier Prime"/>
+                <a:sym typeface="Courier Prime"/>
+              </a:rPr>
+              <a:t>el</a:t>
+            </a:r>
+            <a:r>
+              <a:rPr lang="en-US" sz="2400" dirty="0">
+                <a:solidFill>
+                  <a:srgbClr val="FF914D"/>
+                </a:solidFill>
+                <a:latin typeface="Courier Prime"/>
+                <a:ea typeface="Courier Prime"/>
+                <a:cs typeface="Courier Prime"/>
+                <a:sym typeface="Courier Prime"/>
+              </a:rPr>
+              <a:t> </a:t>
+            </a:r>
+            <a:r>
+              <a:rPr lang="en-US" sz="2400" dirty="0" err="1">
+                <a:solidFill>
+                  <a:srgbClr val="FF914D"/>
+                </a:solidFill>
+                <a:latin typeface="Courier Prime"/>
+                <a:ea typeface="Courier Prime"/>
+                <a:cs typeface="Courier Prime"/>
+                <a:sym typeface="Courier Prime"/>
+              </a:rPr>
+              <a:t>riesgo</a:t>
+            </a:r>
+            <a:r>
+              <a:rPr lang="en-US" sz="2400" dirty="0">
+                <a:solidFill>
+                  <a:srgbClr val="FF914D"/>
+                </a:solidFill>
+                <a:latin typeface="Courier Prime"/>
+                <a:ea typeface="Courier Prime"/>
+                <a:cs typeface="Courier Prime"/>
+                <a:sym typeface="Courier Prime"/>
+              </a:rPr>
+              <a:t> </a:t>
+            </a:r>
+            <a:r>
+              <a:rPr lang="en-US" sz="2400" dirty="0" err="1">
+                <a:solidFill>
+                  <a:srgbClr val="FF914D"/>
+                </a:solidFill>
+                <a:latin typeface="Courier Prime"/>
+                <a:ea typeface="Courier Prime"/>
+                <a:cs typeface="Courier Prime"/>
+                <a:sym typeface="Courier Prime"/>
+              </a:rPr>
+              <a:t>crediticio</a:t>
+            </a:r>
+            <a:r>
+              <a:rPr lang="en-US" sz="2400" dirty="0">
+                <a:solidFill>
+                  <a:srgbClr val="FFFFFF"/>
+                </a:solidFill>
+                <a:latin typeface="Courier Prime"/>
+                <a:ea typeface="Courier Prime"/>
+                <a:cs typeface="Courier Prime"/>
+                <a:sym typeface="Courier Prime"/>
+              </a:rPr>
+              <a:t> de </a:t>
+            </a:r>
+            <a:r>
+              <a:rPr lang="en-US" sz="2400" dirty="0" err="1">
+                <a:solidFill>
+                  <a:srgbClr val="FFFFFF"/>
+                </a:solidFill>
+                <a:latin typeface="Courier Prime"/>
+                <a:ea typeface="Courier Prime"/>
+                <a:cs typeface="Courier Prime"/>
+                <a:sym typeface="Courier Prime"/>
+              </a:rPr>
+              <a:t>los</a:t>
+            </a:r>
+            <a:r>
+              <a:rPr lang="en-US" sz="2400" dirty="0">
+                <a:solidFill>
+                  <a:srgbClr val="FFFFFF"/>
+                </a:solidFill>
+                <a:latin typeface="Courier Prime"/>
+                <a:ea typeface="Courier Prime"/>
+                <a:cs typeface="Courier Prime"/>
+                <a:sym typeface="Courier Prime"/>
+              </a:rPr>
+              <a:t> </a:t>
+            </a:r>
+            <a:r>
+              <a:rPr lang="en-US" sz="2400" dirty="0" err="1">
+                <a:solidFill>
+                  <a:srgbClr val="FFFFFF"/>
+                </a:solidFill>
+                <a:latin typeface="Courier Prime"/>
+                <a:ea typeface="Courier Prime"/>
+                <a:cs typeface="Courier Prime"/>
+                <a:sym typeface="Courier Prime"/>
+              </a:rPr>
+              <a:t>individuos</a:t>
+            </a:r>
+            <a:r>
+              <a:rPr lang="en-US" sz="2400" dirty="0">
+                <a:solidFill>
+                  <a:srgbClr val="FFFFFF"/>
+                </a:solidFill>
+                <a:latin typeface="Courier Prime"/>
+                <a:ea typeface="Courier Prime"/>
+                <a:cs typeface="Courier Prime"/>
+                <a:sym typeface="Courier Prime"/>
+              </a:rPr>
+              <a:t> </a:t>
+            </a:r>
+            <a:r>
+              <a:rPr lang="en-US" sz="2400" dirty="0" err="1">
+                <a:solidFill>
+                  <a:srgbClr val="FFFFFF"/>
+                </a:solidFill>
+                <a:latin typeface="Courier Prime"/>
+                <a:ea typeface="Courier Prime"/>
+                <a:cs typeface="Courier Prime"/>
+                <a:sym typeface="Courier Prime"/>
+              </a:rPr>
+              <a:t>en</a:t>
+            </a:r>
+            <a:r>
+              <a:rPr lang="en-US" sz="2400" dirty="0">
+                <a:solidFill>
+                  <a:srgbClr val="FFFFFF"/>
+                </a:solidFill>
+                <a:latin typeface="Courier Prime"/>
+                <a:ea typeface="Courier Prime"/>
+                <a:cs typeface="Courier Prime"/>
+                <a:sym typeface="Courier Prime"/>
+              </a:rPr>
+              <a:t> </a:t>
+            </a:r>
+            <a:r>
+              <a:rPr lang="en-US" sz="2400" dirty="0" err="1">
+                <a:solidFill>
+                  <a:srgbClr val="FFFFFF"/>
+                </a:solidFill>
+                <a:latin typeface="Courier Prime"/>
+                <a:ea typeface="Courier Prime"/>
+                <a:cs typeface="Courier Prime"/>
+                <a:sym typeface="Courier Prime"/>
+              </a:rPr>
+              <a:t>función</a:t>
+            </a:r>
+            <a:r>
+              <a:rPr lang="en-US" sz="2400" dirty="0">
+                <a:solidFill>
+                  <a:srgbClr val="FFFFFF"/>
+                </a:solidFill>
+                <a:latin typeface="Courier Prime"/>
+                <a:ea typeface="Courier Prime"/>
+                <a:cs typeface="Courier Prime"/>
+                <a:sym typeface="Courier Prime"/>
+              </a:rPr>
+              <a:t> de </a:t>
+            </a:r>
+            <a:r>
+              <a:rPr lang="en-US" sz="2400" dirty="0" err="1">
+                <a:solidFill>
+                  <a:srgbClr val="FFFFFF"/>
+                </a:solidFill>
+                <a:latin typeface="Courier Prime"/>
+                <a:ea typeface="Courier Prime"/>
+                <a:cs typeface="Courier Prime"/>
+                <a:sym typeface="Courier Prime"/>
+              </a:rPr>
+              <a:t>su</a:t>
+            </a:r>
+            <a:r>
+              <a:rPr lang="en-US" sz="2400" dirty="0">
+                <a:solidFill>
+                  <a:srgbClr val="FFFFFF"/>
+                </a:solidFill>
+                <a:latin typeface="Courier Prime"/>
+                <a:ea typeface="Courier Prime"/>
+                <a:cs typeface="Courier Prime"/>
+                <a:sym typeface="Courier Prime"/>
+              </a:rPr>
+              <a:t> </a:t>
+            </a:r>
+            <a:r>
+              <a:rPr lang="en-US" sz="2400" dirty="0" err="1">
+                <a:solidFill>
+                  <a:srgbClr val="FFFFFF"/>
+                </a:solidFill>
+                <a:latin typeface="Courier Prime"/>
+                <a:ea typeface="Courier Prime"/>
+                <a:cs typeface="Courier Prime"/>
+                <a:sym typeface="Courier Prime"/>
+              </a:rPr>
+              <a:t>información</a:t>
+            </a:r>
+            <a:r>
+              <a:rPr lang="en-US" sz="2400" dirty="0">
+                <a:solidFill>
+                  <a:srgbClr val="FFFFFF"/>
+                </a:solidFill>
+                <a:latin typeface="Courier Prime"/>
+                <a:ea typeface="Courier Prime"/>
+                <a:cs typeface="Courier Prime"/>
+                <a:sym typeface="Courier Prime"/>
+              </a:rPr>
+              <a:t> </a:t>
+            </a:r>
+            <a:r>
+              <a:rPr lang="en-US" sz="2400" dirty="0" err="1">
+                <a:solidFill>
+                  <a:srgbClr val="FFFFFF"/>
+                </a:solidFill>
+                <a:latin typeface="Courier Prime"/>
+                <a:ea typeface="Courier Prime"/>
+                <a:cs typeface="Courier Prime"/>
+                <a:sym typeface="Courier Prime"/>
+              </a:rPr>
+              <a:t>financiera</a:t>
+            </a:r>
+            <a:r>
+              <a:rPr lang="en-US" sz="2400" dirty="0">
+                <a:solidFill>
+                  <a:srgbClr val="FFFFFF"/>
+                </a:solidFill>
+                <a:latin typeface="Courier Prime"/>
+                <a:ea typeface="Courier Prime"/>
+                <a:cs typeface="Courier Prime"/>
+                <a:sym typeface="Courier Prime"/>
+              </a:rPr>
+              <a:t> y </a:t>
+            </a:r>
+            <a:r>
+              <a:rPr lang="en-US" sz="2400" dirty="0" err="1">
+                <a:solidFill>
+                  <a:srgbClr val="FFFFFF"/>
+                </a:solidFill>
+                <a:latin typeface="Courier Prime"/>
+                <a:ea typeface="Courier Prime"/>
+                <a:cs typeface="Courier Prime"/>
+                <a:sym typeface="Courier Prime"/>
+              </a:rPr>
+              <a:t>demográfica</a:t>
+            </a:r>
+            <a:r>
+              <a:rPr lang="en-US" sz="2400" dirty="0">
+                <a:solidFill>
+                  <a:srgbClr val="FFFFFF"/>
+                </a:solidFill>
+                <a:latin typeface="Courier Prime"/>
+                <a:ea typeface="Courier Prime"/>
+                <a:cs typeface="Courier Prime"/>
+                <a:sym typeface="Courier Prime"/>
+              </a:rPr>
+              <a:t> </a:t>
+            </a:r>
+            <a:r>
+              <a:rPr lang="en-US" sz="2400" dirty="0" err="1">
+                <a:solidFill>
+                  <a:srgbClr val="FFFFFF"/>
+                </a:solidFill>
+                <a:latin typeface="Courier Prime"/>
+                <a:ea typeface="Courier Prime"/>
+                <a:cs typeface="Courier Prime"/>
+                <a:sym typeface="Courier Prime"/>
+              </a:rPr>
+              <a:t>utilizando</a:t>
+            </a:r>
+            <a:r>
+              <a:rPr lang="en-US" sz="2400" dirty="0">
+                <a:solidFill>
+                  <a:srgbClr val="FFFFFF"/>
+                </a:solidFill>
+                <a:latin typeface="Courier Prime"/>
+                <a:ea typeface="Courier Prime"/>
+                <a:cs typeface="Courier Prime"/>
+                <a:sym typeface="Courier Prime"/>
+              </a:rPr>
+              <a:t> </a:t>
+            </a:r>
+            <a:r>
+              <a:rPr lang="en-US" sz="2400" dirty="0" err="1">
+                <a:solidFill>
+                  <a:srgbClr val="FFFFFF"/>
+                </a:solidFill>
+                <a:latin typeface="Courier Prime"/>
+                <a:ea typeface="Courier Prime"/>
+                <a:cs typeface="Courier Prime"/>
+                <a:sym typeface="Courier Prime"/>
+              </a:rPr>
+              <a:t>el</a:t>
+            </a:r>
+            <a:r>
+              <a:rPr lang="en-US" sz="2400" dirty="0">
+                <a:solidFill>
+                  <a:srgbClr val="FFFFFF"/>
+                </a:solidFill>
+                <a:latin typeface="Courier Prime"/>
+                <a:ea typeface="Courier Prime"/>
+                <a:cs typeface="Courier Prime"/>
+                <a:sym typeface="Courier Prime"/>
+              </a:rPr>
+              <a:t> dataset de </a:t>
+            </a:r>
+            <a:r>
+              <a:rPr lang="en-US" sz="2400" dirty="0" err="1">
+                <a:solidFill>
+                  <a:srgbClr val="FFFFFF"/>
+                </a:solidFill>
+                <a:latin typeface="Courier Prime"/>
+                <a:ea typeface="Courier Prime"/>
+                <a:cs typeface="Courier Prime"/>
+                <a:sym typeface="Courier Prime"/>
+              </a:rPr>
+              <a:t>kaggle</a:t>
+            </a:r>
+            <a:r>
+              <a:rPr lang="en-US" sz="2400" dirty="0">
+                <a:solidFill>
+                  <a:srgbClr val="FFFFFF"/>
+                </a:solidFill>
+                <a:latin typeface="Courier Prime"/>
+                <a:ea typeface="Courier Prime"/>
+                <a:cs typeface="Courier Prime"/>
+                <a:sym typeface="Courier Prime"/>
+              </a:rPr>
+              <a:t> (</a:t>
+            </a:r>
+            <a:r>
+              <a:rPr lang="en-US" sz="2400" dirty="0" err="1">
+                <a:solidFill>
+                  <a:srgbClr val="FFFFFF"/>
+                </a:solidFill>
+                <a:latin typeface="Courier Prime"/>
+                <a:ea typeface="Courier Prime"/>
+                <a:cs typeface="Courier Prime"/>
+                <a:sym typeface="Courier Prime"/>
+              </a:rPr>
+              <a:t>ver</a:t>
+            </a:r>
+            <a:r>
+              <a:rPr lang="en-US" sz="2400" dirty="0">
+                <a:solidFill>
+                  <a:srgbClr val="FFFFFF"/>
+                </a:solidFill>
+                <a:latin typeface="Courier Prime"/>
+                <a:ea typeface="Courier Prime"/>
+                <a:cs typeface="Courier Prime"/>
+                <a:sym typeface="Courier Prime"/>
+              </a:rPr>
+              <a:t> </a:t>
+            </a:r>
+            <a:r>
+              <a:rPr lang="en-US" sz="2400" dirty="0" err="1">
+                <a:solidFill>
+                  <a:srgbClr val="FFFFFF"/>
+                </a:solidFill>
+                <a:latin typeface="Courier Prime"/>
+                <a:ea typeface="Courier Prime"/>
+                <a:cs typeface="Courier Prime"/>
+                <a:sym typeface="Courier Prime"/>
+              </a:rPr>
+              <a:t>biblio</a:t>
+            </a:r>
+            <a:r>
+              <a:rPr lang="en-US" sz="2400" dirty="0">
+                <a:solidFill>
+                  <a:srgbClr val="FFFFFF"/>
+                </a:solidFill>
+                <a:latin typeface="Courier Prime"/>
+                <a:ea typeface="Courier Prime"/>
+                <a:cs typeface="Courier Prime"/>
+                <a:sym typeface="Courier Prime"/>
+              </a:rPr>
+              <a:t>). </a:t>
             </a:r>
           </a:p>
         </p:txBody>
@@ -10350,19 +11310,163 @@
               </a:spcBef>
             </a:pPr>
             <a:r>
-              <a:rPr lang="en-US" sz="2400" u="none" strike="noStrike">
-                <a:solidFill>
-                  <a:srgbClr val="FFFFFF"/>
-                </a:solidFill>
-                <a:latin typeface="Courier Prime"/>
-                <a:ea typeface="Courier Prime"/>
-                <a:cs typeface="Courier Prime"/>
-                <a:sym typeface="Courier Prime"/>
-              </a:rPr>
-              <a:t>La tarea consiste en analizar estas características y </a:t>
-            </a:r>
-            <a:r>
-              <a:rPr lang="en-US" sz="2400" u="none" strike="noStrike">
+              <a:rPr lang="en-US" sz="2400" u="none" strike="noStrike" dirty="0">
+                <a:solidFill>
+                  <a:srgbClr val="FFFFFF"/>
+                </a:solidFill>
+                <a:latin typeface="Courier Prime"/>
+                <a:ea typeface="Courier Prime"/>
+                <a:cs typeface="Courier Prime"/>
+                <a:sym typeface="Courier Prime"/>
+              </a:rPr>
+              <a:t>La </a:t>
+            </a:r>
+            <a:r>
+              <a:rPr lang="en-US" sz="2400" u="none" strike="noStrike" dirty="0" err="1">
+                <a:solidFill>
+                  <a:srgbClr val="FFFFFF"/>
+                </a:solidFill>
+                <a:latin typeface="Courier Prime"/>
+                <a:ea typeface="Courier Prime"/>
+                <a:cs typeface="Courier Prime"/>
+                <a:sym typeface="Courier Prime"/>
+              </a:rPr>
+              <a:t>tarea</a:t>
+            </a:r>
+            <a:r>
+              <a:rPr lang="en-US" sz="2400" u="none" strike="noStrike" dirty="0">
+                <a:solidFill>
+                  <a:srgbClr val="FFFFFF"/>
+                </a:solidFill>
+                <a:latin typeface="Courier Prime"/>
+                <a:ea typeface="Courier Prime"/>
+                <a:cs typeface="Courier Prime"/>
+                <a:sym typeface="Courier Prime"/>
+              </a:rPr>
+              <a:t> </a:t>
+            </a:r>
+            <a:r>
+              <a:rPr lang="en-US" sz="2400" u="none" strike="noStrike" dirty="0" err="1">
+                <a:solidFill>
+                  <a:srgbClr val="FFFFFF"/>
+                </a:solidFill>
+                <a:latin typeface="Courier Prime"/>
+                <a:ea typeface="Courier Prime"/>
+                <a:cs typeface="Courier Prime"/>
+                <a:sym typeface="Courier Prime"/>
+              </a:rPr>
+              <a:t>consiste</a:t>
+            </a:r>
+            <a:r>
+              <a:rPr lang="en-US" sz="2400" u="none" strike="noStrike" dirty="0">
+                <a:solidFill>
+                  <a:srgbClr val="FFFFFF"/>
+                </a:solidFill>
+                <a:latin typeface="Courier Prime"/>
+                <a:ea typeface="Courier Prime"/>
+                <a:cs typeface="Courier Prime"/>
+                <a:sym typeface="Courier Prime"/>
+              </a:rPr>
+              <a:t> </a:t>
+            </a:r>
+            <a:r>
+              <a:rPr lang="en-US" sz="2400" u="none" strike="noStrike" dirty="0" err="1">
+                <a:solidFill>
+                  <a:srgbClr val="FFFFFF"/>
+                </a:solidFill>
+                <a:latin typeface="Courier Prime"/>
+                <a:ea typeface="Courier Prime"/>
+                <a:cs typeface="Courier Prime"/>
+                <a:sym typeface="Courier Prime"/>
+              </a:rPr>
+              <a:t>en</a:t>
+            </a:r>
+            <a:r>
+              <a:rPr lang="en-US" sz="2400" u="none" strike="noStrike" dirty="0">
+                <a:solidFill>
+                  <a:srgbClr val="FFFFFF"/>
+                </a:solidFill>
+                <a:latin typeface="Courier Prime"/>
+                <a:ea typeface="Courier Prime"/>
+                <a:cs typeface="Courier Prime"/>
+                <a:sym typeface="Courier Prime"/>
+              </a:rPr>
+              <a:t> </a:t>
+            </a:r>
+            <a:r>
+              <a:rPr lang="en-US" sz="2400" u="none" strike="noStrike" dirty="0" err="1">
+                <a:solidFill>
+                  <a:srgbClr val="FFFFFF"/>
+                </a:solidFill>
+                <a:latin typeface="Courier Prime"/>
+                <a:ea typeface="Courier Prime"/>
+                <a:cs typeface="Courier Prime"/>
+                <a:sym typeface="Courier Prime"/>
+              </a:rPr>
+              <a:t>analizar</a:t>
+            </a:r>
+            <a:r>
+              <a:rPr lang="en-US" sz="2400" u="none" strike="noStrike" dirty="0">
+                <a:solidFill>
+                  <a:srgbClr val="FFFFFF"/>
+                </a:solidFill>
+                <a:latin typeface="Courier Prime"/>
+                <a:ea typeface="Courier Prime"/>
+                <a:cs typeface="Courier Prime"/>
+                <a:sym typeface="Courier Prime"/>
+              </a:rPr>
+              <a:t> </a:t>
+            </a:r>
+            <a:r>
+              <a:rPr lang="en-US" sz="2400" u="none" strike="noStrike" dirty="0" err="1">
+                <a:solidFill>
+                  <a:srgbClr val="FFFFFF"/>
+                </a:solidFill>
+                <a:latin typeface="Courier Prime"/>
+                <a:ea typeface="Courier Prime"/>
+                <a:cs typeface="Courier Prime"/>
+                <a:sym typeface="Courier Prime"/>
+              </a:rPr>
+              <a:t>estas</a:t>
+            </a:r>
+            <a:r>
+              <a:rPr lang="en-US" sz="2400" u="none" strike="noStrike" dirty="0">
+                <a:solidFill>
+                  <a:srgbClr val="FFFFFF"/>
+                </a:solidFill>
+                <a:latin typeface="Courier Prime"/>
+                <a:ea typeface="Courier Prime"/>
+                <a:cs typeface="Courier Prime"/>
+                <a:sym typeface="Courier Prime"/>
+              </a:rPr>
+              <a:t> </a:t>
+            </a:r>
+            <a:r>
+              <a:rPr lang="en-US" sz="2400" u="none" strike="noStrike" dirty="0" err="1">
+                <a:solidFill>
+                  <a:srgbClr val="FFFFFF"/>
+                </a:solidFill>
+                <a:latin typeface="Courier Prime"/>
+                <a:ea typeface="Courier Prime"/>
+                <a:cs typeface="Courier Prime"/>
+                <a:sym typeface="Courier Prime"/>
+              </a:rPr>
+              <a:t>características</a:t>
+            </a:r>
+            <a:r>
+              <a:rPr lang="en-US" sz="2400" u="none" strike="noStrike" dirty="0">
+                <a:solidFill>
+                  <a:srgbClr val="FFFFFF"/>
+                </a:solidFill>
+                <a:latin typeface="Courier Prime"/>
+                <a:ea typeface="Courier Prime"/>
+                <a:cs typeface="Courier Prime"/>
+                <a:sym typeface="Courier Prime"/>
+              </a:rPr>
+              <a:t> y </a:t>
+            </a:r>
+            <a:r>
+              <a:rPr lang="en-US" sz="2400" u="none" strike="noStrike" dirty="0" err="1">
                 <a:solidFill>
                   <a:srgbClr val="FF914D"/>
                 </a:solidFill>
@@ -10371,19 +11475,319 @@
                 <a:cs typeface="Courier Prime"/>
                 <a:sym typeface="Courier Prime"/>
               </a:rPr>
-              <a:t>construir un modelo de ML usando `Random forest classifier`</a:t>
-            </a:r>
-            <a:r>
-              <a:rPr lang="en-US" sz="2400" u="none" strike="noStrike">
-                <a:solidFill>
-                  <a:srgbClr val="FFFFFF"/>
-                </a:solidFill>
-                <a:latin typeface="Courier Prime"/>
-                <a:ea typeface="Courier Prime"/>
-                <a:cs typeface="Courier Prime"/>
-                <a:sym typeface="Courier Prime"/>
-              </a:rPr>
-              <a:t> que pueda predecir si una persona tiene alta o baja probabilidad de ser un prestatario de alto riesgo.</a:t>
+              <a:t>construir</a:t>
+            </a:r>
+            <a:r>
+              <a:rPr lang="en-US" sz="2400" u="none" strike="noStrike" dirty="0">
+                <a:solidFill>
+                  <a:srgbClr val="FF914D"/>
+                </a:solidFill>
+                <a:latin typeface="Courier Prime"/>
+                <a:ea typeface="Courier Prime"/>
+                <a:cs typeface="Courier Prime"/>
+                <a:sym typeface="Courier Prime"/>
+              </a:rPr>
+              <a:t> un </a:t>
+            </a:r>
+            <a:r>
+              <a:rPr lang="en-US" sz="2400" u="none" strike="noStrike" dirty="0" err="1">
+                <a:solidFill>
+                  <a:srgbClr val="FF914D"/>
+                </a:solidFill>
+                <a:latin typeface="Courier Prime"/>
+                <a:ea typeface="Courier Prime"/>
+                <a:cs typeface="Courier Prime"/>
+                <a:sym typeface="Courier Prime"/>
+              </a:rPr>
+              <a:t>modelo</a:t>
+            </a:r>
+            <a:r>
+              <a:rPr lang="en-US" sz="2400" u="none" strike="noStrike" dirty="0">
+                <a:solidFill>
+                  <a:srgbClr val="FF914D"/>
+                </a:solidFill>
+                <a:latin typeface="Courier Prime"/>
+                <a:ea typeface="Courier Prime"/>
+                <a:cs typeface="Courier Prime"/>
+                <a:sym typeface="Courier Prime"/>
+              </a:rPr>
+              <a:t> de ML </a:t>
+            </a:r>
+            <a:r>
+              <a:rPr lang="en-US" sz="2400" u="none" strike="noStrike" dirty="0" err="1">
+                <a:solidFill>
+                  <a:srgbClr val="FF914D"/>
+                </a:solidFill>
+                <a:latin typeface="Courier Prime"/>
+                <a:ea typeface="Courier Prime"/>
+                <a:cs typeface="Courier Prime"/>
+                <a:sym typeface="Courier Prime"/>
+              </a:rPr>
+              <a:t>usando</a:t>
+            </a:r>
+            <a:r>
+              <a:rPr lang="en-US" sz="2400" u="none" strike="noStrike" dirty="0">
+                <a:solidFill>
+                  <a:srgbClr val="FF914D"/>
+                </a:solidFill>
+                <a:latin typeface="Courier Prime"/>
+                <a:ea typeface="Courier Prime"/>
+                <a:cs typeface="Courier Prime"/>
+                <a:sym typeface="Courier Prime"/>
+              </a:rPr>
+              <a:t> `Random forest classifier`</a:t>
+            </a:r>
+            <a:r>
+              <a:rPr lang="en-US" sz="2400" u="none" strike="noStrike" dirty="0">
+                <a:solidFill>
+                  <a:srgbClr val="FFFFFF"/>
+                </a:solidFill>
+                <a:latin typeface="Courier Prime"/>
+                <a:ea typeface="Courier Prime"/>
+                <a:cs typeface="Courier Prime"/>
+                <a:sym typeface="Courier Prime"/>
+              </a:rPr>
+              <a:t> que </a:t>
+            </a:r>
+            <a:r>
+              <a:rPr lang="en-US" sz="2400" u="none" strike="noStrike" dirty="0" err="1">
+                <a:solidFill>
+                  <a:srgbClr val="FFFFFF"/>
+                </a:solidFill>
+                <a:latin typeface="Courier Prime"/>
+                <a:ea typeface="Courier Prime"/>
+                <a:cs typeface="Courier Prime"/>
+                <a:sym typeface="Courier Prime"/>
+              </a:rPr>
+              <a:t>pueda</a:t>
+            </a:r>
+            <a:r>
+              <a:rPr lang="en-US" sz="2400" u="none" strike="noStrike" dirty="0">
+                <a:solidFill>
+                  <a:srgbClr val="FFFFFF"/>
+                </a:solidFill>
+                <a:latin typeface="Courier Prime"/>
+                <a:ea typeface="Courier Prime"/>
+                <a:cs typeface="Courier Prime"/>
+                <a:sym typeface="Courier Prime"/>
+              </a:rPr>
+              <a:t> </a:t>
+            </a:r>
+            <a:r>
+              <a:rPr lang="en-US" sz="2400" u="none" strike="noStrike" dirty="0" err="1">
+                <a:solidFill>
+                  <a:srgbClr val="FFFFFF"/>
+                </a:solidFill>
+                <a:latin typeface="Courier Prime"/>
+                <a:ea typeface="Courier Prime"/>
+                <a:cs typeface="Courier Prime"/>
+                <a:sym typeface="Courier Prime"/>
+              </a:rPr>
+              <a:t>predecir</a:t>
+            </a:r>
+            <a:r>
+              <a:rPr lang="en-US" sz="2400" u="none" strike="noStrike" dirty="0">
+                <a:solidFill>
+                  <a:srgbClr val="FFFFFF"/>
+                </a:solidFill>
+                <a:latin typeface="Courier Prime"/>
+                <a:ea typeface="Courier Prime"/>
+                <a:cs typeface="Courier Prime"/>
+                <a:sym typeface="Courier Prime"/>
+              </a:rPr>
+              <a:t> </a:t>
+            </a:r>
+            <a:r>
+              <a:rPr lang="en-US" sz="2400" u="none" strike="noStrike" dirty="0" err="1">
+                <a:solidFill>
+                  <a:srgbClr val="FFFFFF"/>
+                </a:solidFill>
+                <a:latin typeface="Courier Prime"/>
+                <a:ea typeface="Courier Prime"/>
+                <a:cs typeface="Courier Prime"/>
+                <a:sym typeface="Courier Prime"/>
+              </a:rPr>
+              <a:t>si</a:t>
+            </a:r>
+            <a:r>
+              <a:rPr lang="en-US" sz="2400" u="none" strike="noStrike" dirty="0">
+                <a:solidFill>
+                  <a:srgbClr val="FFFFFF"/>
+                </a:solidFill>
+                <a:latin typeface="Courier Prime"/>
+                <a:ea typeface="Courier Prime"/>
+                <a:cs typeface="Courier Prime"/>
+                <a:sym typeface="Courier Prime"/>
+              </a:rPr>
+              <a:t> </a:t>
+            </a:r>
+            <a:r>
+              <a:rPr lang="en-US" sz="2400" u="none" strike="noStrike" dirty="0" err="1">
+                <a:solidFill>
+                  <a:srgbClr val="FFFFFF"/>
+                </a:solidFill>
+                <a:latin typeface="Courier Prime"/>
+                <a:ea typeface="Courier Prime"/>
+                <a:cs typeface="Courier Prime"/>
+                <a:sym typeface="Courier Prime"/>
+              </a:rPr>
+              <a:t>una</a:t>
+            </a:r>
+            <a:r>
+              <a:rPr lang="en-US" sz="2400" u="none" strike="noStrike" dirty="0">
+                <a:solidFill>
+                  <a:srgbClr val="FFFFFF"/>
+                </a:solidFill>
+                <a:latin typeface="Courier Prime"/>
+                <a:ea typeface="Courier Prime"/>
+                <a:cs typeface="Courier Prime"/>
+                <a:sym typeface="Courier Prime"/>
+              </a:rPr>
+              <a:t> persona </a:t>
+            </a:r>
+            <a:r>
+              <a:rPr lang="en-US" sz="2400" u="none" strike="noStrike" dirty="0" err="1">
+                <a:solidFill>
+                  <a:srgbClr val="FFFFFF"/>
+                </a:solidFill>
+                <a:latin typeface="Courier Prime"/>
+                <a:ea typeface="Courier Prime"/>
+                <a:cs typeface="Courier Prime"/>
+                <a:sym typeface="Courier Prime"/>
+              </a:rPr>
+              <a:t>tiene</a:t>
+            </a:r>
+            <a:r>
+              <a:rPr lang="en-US" sz="2400" u="none" strike="noStrike" dirty="0">
+                <a:solidFill>
+                  <a:srgbClr val="FFFFFF"/>
+                </a:solidFill>
+                <a:latin typeface="Courier Prime"/>
+                <a:ea typeface="Courier Prime"/>
+                <a:cs typeface="Courier Prime"/>
+                <a:sym typeface="Courier Prime"/>
+              </a:rPr>
+              <a:t> </a:t>
+            </a:r>
+            <a:r>
+              <a:rPr lang="en-US" sz="2400" u="none" strike="noStrike" dirty="0" err="1">
+                <a:solidFill>
+                  <a:srgbClr val="FFFFFF"/>
+                </a:solidFill>
+                <a:latin typeface="Courier Prime"/>
+                <a:ea typeface="Courier Prime"/>
+                <a:cs typeface="Courier Prime"/>
+                <a:sym typeface="Courier Prime"/>
+              </a:rPr>
+              <a:t>alta</a:t>
+            </a:r>
+            <a:r>
+              <a:rPr lang="en-US" sz="2400" u="none" strike="noStrike" dirty="0">
+                <a:solidFill>
+                  <a:srgbClr val="FFFFFF"/>
+                </a:solidFill>
+                <a:latin typeface="Courier Prime"/>
+                <a:ea typeface="Courier Prime"/>
+                <a:cs typeface="Courier Prime"/>
+                <a:sym typeface="Courier Prime"/>
+              </a:rPr>
+              <a:t> o </a:t>
+            </a:r>
+            <a:r>
+              <a:rPr lang="en-US" sz="2400" u="none" strike="noStrike" dirty="0" err="1">
+                <a:solidFill>
+                  <a:srgbClr val="FFFFFF"/>
+                </a:solidFill>
+                <a:latin typeface="Courier Prime"/>
+                <a:ea typeface="Courier Prime"/>
+                <a:cs typeface="Courier Prime"/>
+                <a:sym typeface="Courier Prime"/>
+              </a:rPr>
+              <a:t>baja</a:t>
+            </a:r>
+            <a:r>
+              <a:rPr lang="en-US" sz="2400" u="none" strike="noStrike" dirty="0">
+                <a:solidFill>
+                  <a:srgbClr val="FFFFFF"/>
+                </a:solidFill>
+                <a:latin typeface="Courier Prime"/>
+                <a:ea typeface="Courier Prime"/>
+                <a:cs typeface="Courier Prime"/>
+                <a:sym typeface="Courier Prime"/>
+              </a:rPr>
+              <a:t> </a:t>
+            </a:r>
+            <a:r>
+              <a:rPr lang="en-US" sz="2400" u="none" strike="noStrike" dirty="0" err="1">
+                <a:solidFill>
+                  <a:srgbClr val="FFFFFF"/>
+                </a:solidFill>
+                <a:latin typeface="Courier Prime"/>
+                <a:ea typeface="Courier Prime"/>
+                <a:cs typeface="Courier Prime"/>
+                <a:sym typeface="Courier Prime"/>
+              </a:rPr>
+              <a:t>probabilidad</a:t>
+            </a:r>
+            <a:r>
+              <a:rPr lang="en-US" sz="2400" u="none" strike="noStrike" dirty="0">
+                <a:solidFill>
+                  <a:srgbClr val="FFFFFF"/>
+                </a:solidFill>
+                <a:latin typeface="Courier Prime"/>
+                <a:ea typeface="Courier Prime"/>
+                <a:cs typeface="Courier Prime"/>
+                <a:sym typeface="Courier Prime"/>
+              </a:rPr>
+              <a:t> de ser un </a:t>
+            </a:r>
+            <a:r>
+              <a:rPr lang="en-US" sz="2400" u="none" strike="noStrike" dirty="0" err="1">
+                <a:solidFill>
+                  <a:srgbClr val="FFFFFF"/>
+                </a:solidFill>
+                <a:latin typeface="Courier Prime"/>
+                <a:ea typeface="Courier Prime"/>
+                <a:cs typeface="Courier Prime"/>
+                <a:sym typeface="Courier Prime"/>
+              </a:rPr>
+              <a:t>prestatario</a:t>
+            </a:r>
+            <a:r>
+              <a:rPr lang="en-US" sz="2400" u="none" strike="noStrike" dirty="0">
+                <a:solidFill>
+                  <a:srgbClr val="FFFFFF"/>
+                </a:solidFill>
+                <a:latin typeface="Courier Prime"/>
+                <a:ea typeface="Courier Prime"/>
+                <a:cs typeface="Courier Prime"/>
+                <a:sym typeface="Courier Prime"/>
+              </a:rPr>
+              <a:t> de alto </a:t>
+            </a:r>
+            <a:r>
+              <a:rPr lang="en-US" sz="2400" u="none" strike="noStrike" dirty="0" err="1">
+                <a:solidFill>
+                  <a:srgbClr val="FFFFFF"/>
+                </a:solidFill>
+                <a:latin typeface="Courier Prime"/>
+                <a:ea typeface="Courier Prime"/>
+                <a:cs typeface="Courier Prime"/>
+                <a:sym typeface="Courier Prime"/>
+              </a:rPr>
+              <a:t>riesgo</a:t>
+            </a:r>
+            <a:r>
+              <a:rPr lang="en-US" sz="2400" u="none" strike="noStrike" dirty="0">
+                <a:solidFill>
+                  <a:srgbClr val="FFFFFF"/>
+                </a:solidFill>
+                <a:latin typeface="Courier Prime"/>
+                <a:ea typeface="Courier Prime"/>
+                <a:cs typeface="Courier Prime"/>
+                <a:sym typeface="Courier Prime"/>
+              </a:rPr>
+              <a:t>.</a:t>
             </a:r>
           </a:p>
         </p:txBody>

</xml_diff>